<commit_message>
some changes in method reference slide
</commit_message>
<xml_diff>
--- a/slides/Java 8 - Default Methods.pptx
+++ b/slides/Java 8 - Default Methods.pptx
@@ -7,6 +7,7 @@
   </p:sldMasterIdLst>
   <p:sldIdLst>
     <p:sldId id="256" r:id="rId3"/>
+    <p:sldId id="257" r:id="rId4"/>
   </p:sldIdLst>
   <p:sldSz cx="9144000" cy="6858000" type="screen4x3"/>
   <p:notesSz cx="7772400" cy="10058400"/>
@@ -3517,6 +3518,415 @@
         </p:txBody>
       </p:sp>
     </p:spTree>
+  </p:cSld>
+  <p:clrMapOvr>
+    <a:masterClrMapping/>
+  </p:clrMapOvr>
+  <p:timing>
+    <p:tnLst>
+      <p:par>
+        <p:cTn id="1" dur="indefinite" restart="never" nodeType="tmRoot">
+          <p:childTnLst>
+            <p:seq>
+              <p:cTn id="2" nodeType="mainSeq">
+                <p:childTnLst>
+                  <p:par>
+                    <p:cTn id="3"/>
+                  </p:par>
+                </p:childTnLst>
+              </p:cTn>
+              <p:prevCondLst>
+                <p:cond evt="onPrev" delay="0">
+                  <p:tgtEl>
+                    <p:sldTgt/>
+                  </p:tgtEl>
+                </p:cond>
+              </p:prevCondLst>
+              <p:nextCondLst>
+                <p:cond evt="onNext" delay="0">
+                  <p:tgtEl>
+                    <p:sldTgt/>
+                  </p:tgtEl>
+                </p:cond>
+              </p:nextCondLst>
+            </p:seq>
+          </p:childTnLst>
+        </p:cTn>
+      </p:par>
+    </p:tnLst>
+  </p:timing>
+</p:sld>
+</file>
+
+<file path=ppt/slides/slide2.xml><?xml version="1.0" encoding="utf-8"?>
+<p:sld xmlns:a="http://schemas.openxmlformats.org/drawingml/2006/main" xmlns:r="http://schemas.openxmlformats.org/officeDocument/2006/relationships" xmlns:p="http://schemas.openxmlformats.org/presentationml/2006/main">
+  <p:cSld>
+    <p:spTree>
+      <p:nvGrpSpPr>
+        <p:cNvPr id="1" name=""/>
+        <p:cNvGrpSpPr/>
+        <p:nvPr/>
+      </p:nvGrpSpPr>
+      <p:grpSpPr>
+        <a:xfrm>
+          <a:off x="0" y="0"/>
+          <a:ext cx="0" cy="0"/>
+          <a:chOff x="0" y="0"/>
+          <a:chExt cx="0" cy="0"/>
+        </a:xfrm>
+      </p:grpSpPr>
+      <p:sp>
+        <p:nvSpPr>
+          <p:cNvPr id="76" name="CustomShape 1"/>
+          <p:cNvSpPr/>
+          <p:nvPr/>
+        </p:nvSpPr>
+        <p:spPr>
+          <a:xfrm>
+            <a:off x="497160" y="57960"/>
+            <a:ext cx="7820280" cy="1160640"/>
+          </a:xfrm>
+          <a:prstGeom prst="rect">
+            <a:avLst/>
+          </a:prstGeom>
+        </p:spPr>
+        <p:txBody>
+          <a:bodyPr lIns="90000" tIns="45000" rIns="90000" bIns="45000" anchor="b"/>
+          <a:lstStyle/>
+          <a:p>
+            <a:pPr>
+              <a:lnSpc>
+                <a:spcPct val="100000"/>
+              </a:lnSpc>
+            </a:pPr>
+            <a:r>
+              <a:rPr lang="en-US" sz="3200" dirty="0" smtClean="0">
+                <a:solidFill>
+                  <a:srgbClr val="5C7F92"/>
+                </a:solidFill>
+                <a:latin typeface="Lucida Bright"/>
+              </a:rPr>
+              <a:t>Default Methods</a:t>
+            </a:r>
+            <a:endParaRPr dirty="0"/>
+          </a:p>
+        </p:txBody>
+      </p:sp>
+      <p:sp>
+        <p:nvSpPr>
+          <p:cNvPr id="77" name="CustomShape 2"/>
+          <p:cNvSpPr/>
+          <p:nvPr/>
+        </p:nvSpPr>
+        <p:spPr>
+          <a:xfrm>
+            <a:off x="871200" y="1626840"/>
+            <a:ext cx="7808400" cy="4466456"/>
+          </a:xfrm>
+          <a:prstGeom prst="rect">
+            <a:avLst/>
+          </a:prstGeom>
+        </p:spPr>
+        <p:txBody>
+          <a:bodyPr lIns="90000" tIns="45000" rIns="90000" bIns="45000"/>
+          <a:lstStyle/>
+          <a:p>
+            <a:pPr>
+              <a:lnSpc>
+                <a:spcPct val="100000"/>
+              </a:lnSpc>
+            </a:pPr>
+            <a:endParaRPr dirty="0"/>
+          </a:p>
+          <a:p>
+            <a:pPr>
+              <a:lnSpc>
+                <a:spcPct val="100000"/>
+              </a:lnSpc>
+            </a:pPr>
+            <a:r>
+              <a:rPr lang="sv-SE" sz="2000" dirty="0" smtClean="0">
+                <a:solidFill>
+                  <a:srgbClr val="3095B4"/>
+                </a:solidFill>
+              </a:rPr>
+              <a:t>Task:</a:t>
+            </a:r>
+          </a:p>
+          <a:p>
+            <a:pPr marL="457200" indent="-457200">
+              <a:lnSpc>
+                <a:spcPct val="100000"/>
+              </a:lnSpc>
+              <a:buAutoNum type="arabicPeriod"/>
+            </a:pPr>
+            <a:r>
+              <a:rPr lang="sv-SE" sz="2000" dirty="0" err="1" smtClean="0">
+                <a:solidFill>
+                  <a:srgbClr val="3095B4"/>
+                </a:solidFill>
+              </a:rPr>
+              <a:t>Create</a:t>
+            </a:r>
+            <a:r>
+              <a:rPr lang="sv-SE" sz="2000" dirty="0" smtClean="0">
+                <a:solidFill>
+                  <a:srgbClr val="3095B4"/>
+                </a:solidFill>
+              </a:rPr>
+              <a:t> a new Interface </a:t>
+            </a:r>
+            <a:r>
+              <a:rPr lang="sv-SE" sz="2000" dirty="0" err="1" smtClean="0">
+                <a:solidFill>
+                  <a:srgbClr val="3095B4"/>
+                </a:solidFill>
+              </a:rPr>
+              <a:t>with</a:t>
+            </a:r>
+            <a:r>
+              <a:rPr lang="sv-SE" sz="2000" dirty="0" smtClean="0">
+                <a:solidFill>
+                  <a:srgbClr val="3095B4"/>
+                </a:solidFill>
+              </a:rPr>
+              <a:t> </a:t>
+            </a:r>
+            <a:r>
+              <a:rPr lang="sv-SE" sz="2000" dirty="0" err="1" smtClean="0">
+                <a:solidFill>
+                  <a:srgbClr val="3095B4"/>
+                </a:solidFill>
+              </a:rPr>
+              <a:t>one</a:t>
+            </a:r>
+            <a:r>
+              <a:rPr lang="sv-SE" sz="2000" dirty="0" smtClean="0">
+                <a:solidFill>
+                  <a:srgbClr val="3095B4"/>
+                </a:solidFill>
+              </a:rPr>
+              <a:t> abstract </a:t>
+            </a:r>
+            <a:r>
+              <a:rPr lang="sv-SE" sz="2000" dirty="0" err="1" smtClean="0">
+                <a:solidFill>
+                  <a:srgbClr val="3095B4"/>
+                </a:solidFill>
+              </a:rPr>
+              <a:t>method</a:t>
+            </a:r>
+            <a:r>
+              <a:rPr lang="sv-SE" sz="2000" dirty="0" smtClean="0">
+                <a:solidFill>
+                  <a:srgbClr val="3095B4"/>
+                </a:solidFill>
+              </a:rPr>
+              <a:t> and </a:t>
+            </a:r>
+            <a:r>
+              <a:rPr lang="sv-SE" sz="2000" dirty="0" err="1" smtClean="0">
+                <a:solidFill>
+                  <a:srgbClr val="3095B4"/>
+                </a:solidFill>
+              </a:rPr>
+              <a:t>one</a:t>
+            </a:r>
+            <a:r>
+              <a:rPr lang="sv-SE" sz="2000" dirty="0" smtClean="0">
+                <a:solidFill>
+                  <a:srgbClr val="3095B4"/>
+                </a:solidFill>
+              </a:rPr>
+              <a:t> default </a:t>
+            </a:r>
+            <a:r>
+              <a:rPr lang="sv-SE" sz="2000" dirty="0" err="1" smtClean="0">
+                <a:solidFill>
+                  <a:srgbClr val="3095B4"/>
+                </a:solidFill>
+              </a:rPr>
+              <a:t>method</a:t>
+            </a:r>
+            <a:endParaRPr lang="sv-SE" sz="2000" dirty="0" smtClean="0">
+              <a:solidFill>
+                <a:srgbClr val="3095B4"/>
+              </a:solidFill>
+            </a:endParaRPr>
+          </a:p>
+          <a:p>
+            <a:pPr marL="457200" indent="-457200">
+              <a:lnSpc>
+                <a:spcPct val="100000"/>
+              </a:lnSpc>
+              <a:buAutoNum type="arabicPeriod"/>
+            </a:pPr>
+            <a:r>
+              <a:rPr lang="sv-SE" sz="2000" dirty="0" err="1" smtClean="0">
+                <a:solidFill>
+                  <a:srgbClr val="3095B4"/>
+                </a:solidFill>
+              </a:rPr>
+              <a:t>Create</a:t>
+            </a:r>
+            <a:r>
+              <a:rPr lang="sv-SE" sz="2000" dirty="0" smtClean="0">
+                <a:solidFill>
+                  <a:srgbClr val="3095B4"/>
+                </a:solidFill>
+              </a:rPr>
+              <a:t> a new </a:t>
+            </a:r>
+            <a:r>
+              <a:rPr lang="sv-SE" sz="2000" dirty="0" err="1" smtClean="0">
+                <a:solidFill>
+                  <a:srgbClr val="3095B4"/>
+                </a:solidFill>
+              </a:rPr>
+              <a:t>class</a:t>
+            </a:r>
+            <a:r>
+              <a:rPr lang="sv-SE" sz="2000" dirty="0" smtClean="0">
+                <a:solidFill>
+                  <a:srgbClr val="3095B4"/>
+                </a:solidFill>
+              </a:rPr>
+              <a:t> </a:t>
+            </a:r>
+            <a:r>
+              <a:rPr lang="sv-SE" sz="2000" dirty="0" err="1" smtClean="0">
+                <a:solidFill>
+                  <a:srgbClr val="3095B4"/>
+                </a:solidFill>
+              </a:rPr>
+              <a:t>implementing</a:t>
+            </a:r>
+            <a:r>
+              <a:rPr lang="sv-SE" sz="2000" dirty="0" smtClean="0">
+                <a:solidFill>
+                  <a:srgbClr val="3095B4"/>
+                </a:solidFill>
+              </a:rPr>
+              <a:t> </a:t>
+            </a:r>
+            <a:r>
+              <a:rPr lang="sv-SE" sz="2000" dirty="0" err="1" smtClean="0">
+                <a:solidFill>
+                  <a:srgbClr val="3095B4"/>
+                </a:solidFill>
+              </a:rPr>
+              <a:t>your</a:t>
+            </a:r>
+            <a:r>
+              <a:rPr lang="sv-SE" sz="2000" dirty="0" smtClean="0">
+                <a:solidFill>
+                  <a:srgbClr val="3095B4"/>
+                </a:solidFill>
+              </a:rPr>
+              <a:t> interface</a:t>
+            </a:r>
+          </a:p>
+          <a:p>
+            <a:pPr marL="457200" indent="-457200">
+              <a:lnSpc>
+                <a:spcPct val="100000"/>
+              </a:lnSpc>
+              <a:buAutoNum type="arabicPeriod"/>
+            </a:pPr>
+            <a:r>
+              <a:rPr lang="sv-SE" sz="2000" dirty="0" smtClean="0">
+                <a:solidFill>
+                  <a:srgbClr val="3095B4"/>
+                </a:solidFill>
+              </a:rPr>
+              <a:t>Call </a:t>
+            </a:r>
+            <a:r>
+              <a:rPr lang="sv-SE" sz="2000" dirty="0" err="1" smtClean="0">
+                <a:solidFill>
+                  <a:srgbClr val="3095B4"/>
+                </a:solidFill>
+              </a:rPr>
+              <a:t>both</a:t>
+            </a:r>
+            <a:r>
+              <a:rPr lang="sv-SE" sz="2000" dirty="0" smtClean="0">
+                <a:solidFill>
+                  <a:srgbClr val="3095B4"/>
+                </a:solidFill>
+              </a:rPr>
+              <a:t> </a:t>
+            </a:r>
+            <a:r>
+              <a:rPr lang="sv-SE" sz="2000" dirty="0" err="1" smtClean="0">
+                <a:solidFill>
+                  <a:srgbClr val="3095B4"/>
+                </a:solidFill>
+              </a:rPr>
+              <a:t>your</a:t>
+            </a:r>
+            <a:r>
+              <a:rPr lang="sv-SE" sz="2000" dirty="0" smtClean="0">
+                <a:solidFill>
+                  <a:srgbClr val="3095B4"/>
+                </a:solidFill>
+              </a:rPr>
+              <a:t> </a:t>
+            </a:r>
+            <a:r>
+              <a:rPr lang="sv-SE" sz="2000" dirty="0" err="1" smtClean="0">
+                <a:solidFill>
+                  <a:srgbClr val="3095B4"/>
+                </a:solidFill>
+              </a:rPr>
+              <a:t>implemented</a:t>
+            </a:r>
+            <a:r>
+              <a:rPr lang="sv-SE" sz="2000" dirty="0">
+                <a:solidFill>
+                  <a:srgbClr val="3095B4"/>
+                </a:solidFill>
+              </a:rPr>
+              <a:t> </a:t>
+            </a:r>
+            <a:r>
+              <a:rPr lang="sv-SE" sz="2000" dirty="0" err="1" smtClean="0">
+                <a:solidFill>
+                  <a:srgbClr val="3095B4"/>
+                </a:solidFill>
+              </a:rPr>
+              <a:t>method</a:t>
+            </a:r>
+            <a:r>
+              <a:rPr lang="sv-SE" sz="2000" dirty="0" smtClean="0">
+                <a:solidFill>
+                  <a:srgbClr val="3095B4"/>
+                </a:solidFill>
+              </a:rPr>
+              <a:t> and the default </a:t>
+            </a:r>
+            <a:r>
+              <a:rPr lang="sv-SE" sz="2000" dirty="0" err="1" smtClean="0">
+                <a:solidFill>
+                  <a:srgbClr val="3095B4"/>
+                </a:solidFill>
+              </a:rPr>
+              <a:t>method</a:t>
+            </a:r>
+            <a:endParaRPr sz="2000" dirty="0">
+              <a:solidFill>
+                <a:srgbClr val="3095B4"/>
+              </a:solidFill>
+            </a:endParaRPr>
+          </a:p>
+        </p:txBody>
+      </p:sp>
+    </p:spTree>
+    <p:extLst>
+      <p:ext uri="{BB962C8B-B14F-4D97-AF65-F5344CB8AC3E}">
+        <p14:creationId xmlns:p14="http://schemas.microsoft.com/office/powerpoint/2010/main" val="3304598686"/>
+      </p:ext>
+    </p:extLst>
   </p:cSld>
   <p:clrMapOvr>
     <a:masterClrMapping/>

</xml_diff>

<commit_message>
tiny changes for default methods
</commit_message>
<xml_diff>
--- a/slides/Java 8 - Default Methods.pptx
+++ b/slides/Java 8 - Default Methods.pptx
@@ -3706,7 +3706,7 @@
                   <a:srgbClr val="3095B4"/>
                 </a:solidFill>
               </a:rPr>
-              <a:t> abstract </a:t>
+              <a:t> </a:t>
             </a:r>
             <a:r>
               <a:rPr lang="sv-SE" sz="2000" dirty="0" err="1" smtClean="0">
@@ -3714,7 +3714,7 @@
                   <a:srgbClr val="3095B4"/>
                 </a:solidFill>
               </a:rPr>
-              <a:t>method</a:t>
+              <a:t>one</a:t>
             </a:r>
             <a:r>
               <a:rPr lang="sv-SE" sz="2000" dirty="0" smtClean="0">
@@ -3722,15 +3722,7 @@
                   <a:srgbClr val="3095B4"/>
                 </a:solidFill>
               </a:rPr>
-              <a:t> and </a:t>
-            </a:r>
-            <a:r>
-              <a:rPr lang="sv-SE" sz="2000" dirty="0" err="1" smtClean="0">
-                <a:solidFill>
-                  <a:srgbClr val="3095B4"/>
-                </a:solidFill>
-              </a:rPr>
-              <a:t>one</a:t>
+              <a:t> </a:t>
             </a:r>
             <a:r>
               <a:rPr lang="sv-SE" sz="2000" dirty="0" smtClean="0">
@@ -3738,7 +3730,7 @@
                   <a:srgbClr val="3095B4"/>
                 </a:solidFill>
               </a:rPr>
-              <a:t> default </a:t>
+              <a:t>default </a:t>
             </a:r>
             <a:r>
               <a:rPr lang="sv-SE" sz="2000" dirty="0" err="1" smtClean="0">
@@ -3842,12 +3834,20 @@
               <a:t>Call </a:t>
             </a:r>
             <a:r>
+              <a:rPr lang="sv-SE" sz="2000" dirty="0" smtClean="0">
+                <a:solidFill>
+                  <a:srgbClr val="3095B4"/>
+                </a:solidFill>
+              </a:rPr>
+              <a:t> </a:t>
+            </a:r>
+            <a:r>
               <a:rPr lang="sv-SE" sz="2000" dirty="0" err="1" smtClean="0">
                 <a:solidFill>
                   <a:srgbClr val="3095B4"/>
                 </a:solidFill>
               </a:rPr>
-              <a:t>both</a:t>
+              <a:t>your</a:t>
             </a:r>
             <a:r>
               <a:rPr lang="sv-SE" sz="2000" dirty="0" smtClean="0">
@@ -3858,14 +3858,6 @@
               <a:t> </a:t>
             </a:r>
             <a:r>
-              <a:rPr lang="sv-SE" sz="2000" dirty="0" err="1" smtClean="0">
-                <a:solidFill>
-                  <a:srgbClr val="3095B4"/>
-                </a:solidFill>
-              </a:rPr>
-              <a:t>your</a:t>
-            </a:r>
-            <a:r>
               <a:rPr lang="sv-SE" sz="2000" dirty="0" smtClean="0">
                 <a:solidFill>
                   <a:srgbClr val="3095B4"/>
@@ -3874,36 +3866,12 @@
               <a:t> </a:t>
             </a:r>
             <a:r>
-              <a:rPr lang="sv-SE" sz="2000" dirty="0" err="1" smtClean="0">
-                <a:solidFill>
-                  <a:srgbClr val="3095B4"/>
-                </a:solidFill>
-              </a:rPr>
-              <a:t>implemented</a:t>
-            </a:r>
-            <a:r>
-              <a:rPr lang="sv-SE" sz="2000" dirty="0">
-                <a:solidFill>
-                  <a:srgbClr val="3095B4"/>
-                </a:solidFill>
-              </a:rPr>
-              <a:t> </a:t>
-            </a:r>
-            <a:r>
-              <a:rPr lang="sv-SE" sz="2000" dirty="0" err="1" smtClean="0">
-                <a:solidFill>
-                  <a:srgbClr val="3095B4"/>
-                </a:solidFill>
-              </a:rPr>
-              <a:t>method</a:t>
-            </a:r>
-            <a:r>
               <a:rPr lang="sv-SE" sz="2000" dirty="0" smtClean="0">
                 <a:solidFill>
                   <a:srgbClr val="3095B4"/>
                 </a:solidFill>
               </a:rPr>
-              <a:t> and the default </a:t>
+              <a:t>default </a:t>
             </a:r>
             <a:r>
               <a:rPr lang="sv-SE" sz="2000" dirty="0" err="1" smtClean="0">

</xml_diff>